<commit_message>
Added half-star functionality to Skills section
</commit_message>
<xml_diff>
--- a/Template.pptx
+++ b/Template.pptx
@@ -105,6 +105,11 @@
       </a:defRPr>
     </a:lvl9pPr>
   </p:defaultTextStyle>
+  <p:extLst>
+    <p:ext uri="{EFAFB233-063F-42B5-8137-9DF3F51BA10A}">
+      <p15:sldGuideLst xmlns:p15="http://schemas.microsoft.com/office/powerpoint/2012/main"/>
+    </p:ext>
+  </p:extLst>
 </p:presentation>
 </file>
 
@@ -255,7 +260,7 @@
           <a:p>
             <a:fld id="{760EFEA4-0D7D-3D40-9F0C-8ED1EC814993}" type="datetimeFigureOut">
               <a:rPr lang="en-US" smtClean="0"/>
-              <a:t>7/16/20</a:t>
+              <a:t>7/20/20</a:t>
             </a:fld>
             <a:endParaRPr lang="en-US"/>
           </a:p>
@@ -453,7 +458,7 @@
           <a:p>
             <a:fld id="{760EFEA4-0D7D-3D40-9F0C-8ED1EC814993}" type="datetimeFigureOut">
               <a:rPr lang="en-US" smtClean="0"/>
-              <a:t>7/16/20</a:t>
+              <a:t>7/20/20</a:t>
             </a:fld>
             <a:endParaRPr lang="en-US"/>
           </a:p>
@@ -661,7 +666,7 @@
           <a:p>
             <a:fld id="{760EFEA4-0D7D-3D40-9F0C-8ED1EC814993}" type="datetimeFigureOut">
               <a:rPr lang="en-US" smtClean="0"/>
-              <a:t>7/16/20</a:t>
+              <a:t>7/20/20</a:t>
             </a:fld>
             <a:endParaRPr lang="en-US"/>
           </a:p>
@@ -859,7 +864,7 @@
           <a:p>
             <a:fld id="{760EFEA4-0D7D-3D40-9F0C-8ED1EC814993}" type="datetimeFigureOut">
               <a:rPr lang="en-US" smtClean="0"/>
-              <a:t>7/16/20</a:t>
+              <a:t>7/20/20</a:t>
             </a:fld>
             <a:endParaRPr lang="en-US"/>
           </a:p>
@@ -1134,7 +1139,7 @@
           <a:p>
             <a:fld id="{760EFEA4-0D7D-3D40-9F0C-8ED1EC814993}" type="datetimeFigureOut">
               <a:rPr lang="en-US" smtClean="0"/>
-              <a:t>7/16/20</a:t>
+              <a:t>7/20/20</a:t>
             </a:fld>
             <a:endParaRPr lang="en-US"/>
           </a:p>
@@ -1399,7 +1404,7 @@
           <a:p>
             <a:fld id="{760EFEA4-0D7D-3D40-9F0C-8ED1EC814993}" type="datetimeFigureOut">
               <a:rPr lang="en-US" smtClean="0"/>
-              <a:t>7/16/20</a:t>
+              <a:t>7/20/20</a:t>
             </a:fld>
             <a:endParaRPr lang="en-US"/>
           </a:p>
@@ -1811,7 +1816,7 @@
           <a:p>
             <a:fld id="{760EFEA4-0D7D-3D40-9F0C-8ED1EC814993}" type="datetimeFigureOut">
               <a:rPr lang="en-US" smtClean="0"/>
-              <a:t>7/16/20</a:t>
+              <a:t>7/20/20</a:t>
             </a:fld>
             <a:endParaRPr lang="en-US"/>
           </a:p>
@@ -1952,7 +1957,7 @@
           <a:p>
             <a:fld id="{760EFEA4-0D7D-3D40-9F0C-8ED1EC814993}" type="datetimeFigureOut">
               <a:rPr lang="en-US" smtClean="0"/>
-              <a:t>7/16/20</a:t>
+              <a:t>7/20/20</a:t>
             </a:fld>
             <a:endParaRPr lang="en-US"/>
           </a:p>
@@ -2065,7 +2070,7 @@
           <a:p>
             <a:fld id="{760EFEA4-0D7D-3D40-9F0C-8ED1EC814993}" type="datetimeFigureOut">
               <a:rPr lang="en-US" smtClean="0"/>
-              <a:t>7/16/20</a:t>
+              <a:t>7/20/20</a:t>
             </a:fld>
             <a:endParaRPr lang="en-US"/>
           </a:p>
@@ -2376,7 +2381,7 @@
           <a:p>
             <a:fld id="{760EFEA4-0D7D-3D40-9F0C-8ED1EC814993}" type="datetimeFigureOut">
               <a:rPr lang="en-US" smtClean="0"/>
-              <a:t>7/16/20</a:t>
+              <a:t>7/20/20</a:t>
             </a:fld>
             <a:endParaRPr lang="en-US"/>
           </a:p>
@@ -2664,7 +2669,7 @@
           <a:p>
             <a:fld id="{760EFEA4-0D7D-3D40-9F0C-8ED1EC814993}" type="datetimeFigureOut">
               <a:rPr lang="en-US" smtClean="0"/>
-              <a:t>7/16/20</a:t>
+              <a:t>7/20/20</a:t>
             </a:fld>
             <a:endParaRPr lang="en-US"/>
           </a:p>
@@ -2905,7 +2910,7 @@
           <a:p>
             <a:fld id="{760EFEA4-0D7D-3D40-9F0C-8ED1EC814993}" type="datetimeFigureOut">
               <a:rPr lang="en-US" smtClean="0"/>
-              <a:t>7/16/20</a:t>
+              <a:t>7/20/20</a:t>
             </a:fld>
             <a:endParaRPr lang="en-US"/>
           </a:p>
@@ -3448,6 +3453,170 @@
           </a:p>
         </p:txBody>
       </p:sp>
+      <p:sp>
+        <p:nvSpPr>
+          <p:cNvPr id="3" name="5-Point Star 2">
+            <a:extLst>
+              <a:ext uri="{FF2B5EF4-FFF2-40B4-BE49-F238E27FC236}">
+                <a16:creationId xmlns:a16="http://schemas.microsoft.com/office/drawing/2014/main" id="{C4F23D9C-4E0F-F644-A649-9AD983BE47AB}"/>
+              </a:ext>
+            </a:extLst>
+          </p:cNvPr>
+          <p:cNvSpPr/>
+          <p:nvPr/>
+        </p:nvSpPr>
+        <p:spPr>
+          <a:xfrm>
+            <a:off x="4797777" y="1811971"/>
+            <a:ext cx="1298223" cy="1298223"/>
+          </a:xfrm>
+          <a:prstGeom prst="star5">
+            <a:avLst>
+              <a:gd name="adj" fmla="val 25469"/>
+              <a:gd name="hf" fmla="val 105146"/>
+              <a:gd name="vf" fmla="val 110557"/>
+            </a:avLst>
+          </a:prstGeom>
+          <a:solidFill>
+            <a:schemeClr val="bg1"/>
+          </a:solidFill>
+          <a:ln w="50800">
+            <a:noFill/>
+          </a:ln>
+        </p:spPr>
+        <p:style>
+          <a:lnRef idx="2">
+            <a:schemeClr val="accent1">
+              <a:shade val="50000"/>
+            </a:schemeClr>
+          </a:lnRef>
+          <a:fillRef idx="1">
+            <a:schemeClr val="accent1"/>
+          </a:fillRef>
+          <a:effectRef idx="0">
+            <a:schemeClr val="accent1"/>
+          </a:effectRef>
+          <a:fontRef idx="minor">
+            <a:schemeClr val="lt1"/>
+          </a:fontRef>
+        </p:style>
+        <p:txBody>
+          <a:bodyPr rtlCol="0" anchor="ctr"/>
+          <a:lstStyle/>
+          <a:p>
+            <a:pPr algn="ctr"/>
+            <a:endParaRPr lang="en-US"/>
+          </a:p>
+        </p:txBody>
+      </p:sp>
+      <p:grpSp>
+        <p:nvGrpSpPr>
+          <p:cNvPr id="7" name="Group 6">
+            <a:extLst>
+              <a:ext uri="{FF2B5EF4-FFF2-40B4-BE49-F238E27FC236}">
+                <a16:creationId xmlns:a16="http://schemas.microsoft.com/office/drawing/2014/main" id="{7CC3D561-17B4-0240-8F1B-789724F7DB64}"/>
+              </a:ext>
+            </a:extLst>
+          </p:cNvPr>
+          <p:cNvGrpSpPr/>
+          <p:nvPr/>
+        </p:nvGrpSpPr>
+        <p:grpSpPr>
+          <a:xfrm>
+            <a:off x="6533874" y="1317539"/>
+            <a:ext cx="1302171" cy="1308100"/>
+            <a:chOff x="6533874" y="1317539"/>
+            <a:chExt cx="1302171" cy="1308100"/>
+          </a:xfrm>
+        </p:grpSpPr>
+        <p:sp>
+          <p:nvSpPr>
+            <p:cNvPr id="5" name="5-Point Star 4">
+              <a:extLst>
+                <a:ext uri="{FF2B5EF4-FFF2-40B4-BE49-F238E27FC236}">
+                  <a16:creationId xmlns:a16="http://schemas.microsoft.com/office/drawing/2014/main" id="{F921AAB6-253B-AB47-87A6-86EF75BBF1D8}"/>
+                </a:ext>
+              </a:extLst>
+            </p:cNvPr>
+            <p:cNvSpPr/>
+            <p:nvPr/>
+          </p:nvSpPr>
+          <p:spPr>
+            <a:xfrm>
+              <a:off x="6537822" y="1327416"/>
+              <a:ext cx="1298223" cy="1298223"/>
+            </a:xfrm>
+            <a:prstGeom prst="star5">
+              <a:avLst>
+                <a:gd name="adj" fmla="val 25469"/>
+                <a:gd name="hf" fmla="val 105146"/>
+                <a:gd name="vf" fmla="val 110557"/>
+              </a:avLst>
+            </a:prstGeom>
+            <a:noFill/>
+            <a:ln w="50800">
+              <a:solidFill>
+                <a:schemeClr val="bg1">
+                  <a:alpha val="39000"/>
+                </a:schemeClr>
+              </a:solidFill>
+            </a:ln>
+          </p:spPr>
+          <p:style>
+            <a:lnRef idx="2">
+              <a:schemeClr val="accent1">
+                <a:shade val="50000"/>
+              </a:schemeClr>
+            </a:lnRef>
+            <a:fillRef idx="1">
+              <a:schemeClr val="accent1"/>
+            </a:fillRef>
+            <a:effectRef idx="0">
+              <a:schemeClr val="accent1"/>
+            </a:effectRef>
+            <a:fontRef idx="minor">
+              <a:schemeClr val="lt1"/>
+            </a:fontRef>
+          </p:style>
+          <p:txBody>
+            <a:bodyPr rtlCol="0" anchor="ctr"/>
+            <a:lstStyle/>
+            <a:p>
+              <a:pPr algn="ctr"/>
+              <a:endParaRPr lang="en-US"/>
+            </a:p>
+          </p:txBody>
+        </p:sp>
+        <p:pic>
+          <p:nvPicPr>
+            <p:cNvPr id="6" name="Picture 5" descr="A close up of a box&#10;&#10;Description automatically generated">
+              <a:extLst>
+                <a:ext uri="{FF2B5EF4-FFF2-40B4-BE49-F238E27FC236}">
+                  <a16:creationId xmlns:a16="http://schemas.microsoft.com/office/drawing/2014/main" id="{9E5A75DB-4198-D644-AD8D-C2F35915768F}"/>
+                </a:ext>
+              </a:extLst>
+            </p:cNvPr>
+            <p:cNvPicPr>
+              <a:picLocks noChangeAspect="1"/>
+            </p:cNvPicPr>
+            <p:nvPr/>
+          </p:nvPicPr>
+          <p:blipFill rotWithShape="1">
+            <a:blip r:embed="rId2"/>
+            <a:srcRect r="49586"/>
+            <a:stretch/>
+          </p:blipFill>
+          <p:spPr>
+            <a:xfrm>
+              <a:off x="6533874" y="1317539"/>
+              <a:ext cx="653059" cy="1308100"/>
+            </a:xfrm>
+            <a:prstGeom prst="rect">
+              <a:avLst/>
+            </a:prstGeom>
+          </p:spPr>
+        </p:pic>
+      </p:grpSp>
     </p:spTree>
     <p:extLst>
       <p:ext uri="{BB962C8B-B14F-4D97-AF65-F5344CB8AC3E}">

</xml_diff>